<commit_message>
kissebb javítások a prezi előtt
</commit_message>
<xml_diff>
--- a/Projektlabor_bemutato.pptx
+++ b/Projektlabor_bemutato.pptx
@@ -11815,7 +11815,7 @@
           <a:p>
             <a:fld id="{745C4CBD-10FD-4B55-A676-C60555471A76}" type="datetimeFigureOut">
               <a:rPr lang="hu-HU" smtClean="0"/>
-              <a:t>2018. 04. 12.</a:t>
+              <a:t>2018. 05. 03.</a:t>
             </a:fld>
             <a:endParaRPr lang="hu-HU"/>
           </a:p>
@@ -12357,7 +12357,7 @@
           <a:p>
             <a:fld id="{726DE91D-709E-4193-B9BD-BC341FCF5AFA}" type="datetime1">
               <a:rPr lang="en-US" smtClean="0"/>
-              <a:t>4/12/2018</a:t>
+              <a:t>5/3/2018</a:t>
             </a:fld>
             <a:endParaRPr lang="en-US" dirty="0"/>
           </a:p>
@@ -12563,7 +12563,7 @@
           <a:p>
             <a:fld id="{E1CCCF3A-A338-4948-920B-F6208C097332}" type="datetime1">
               <a:rPr lang="en-US" smtClean="0"/>
-              <a:t>4/12/2018</a:t>
+              <a:t>5/3/2018</a:t>
             </a:fld>
             <a:endParaRPr lang="en-US" dirty="0"/>
           </a:p>
@@ -12744,7 +12744,7 @@
           <a:p>
             <a:fld id="{AC5E66AA-358D-4CE6-BD73-EB4B7D199B51}" type="datetime1">
               <a:rPr lang="en-US" smtClean="0"/>
-              <a:t>4/12/2018</a:t>
+              <a:t>5/3/2018</a:t>
             </a:fld>
             <a:endParaRPr lang="en-US" dirty="0"/>
           </a:p>
@@ -12950,7 +12950,7 @@
           <a:p>
             <a:fld id="{33484FD8-3941-45EA-BBB1-3F3F2C453479}" type="datetime1">
               <a:rPr lang="en-US" smtClean="0"/>
-              <a:t>4/12/2018</a:t>
+              <a:t>5/3/2018</a:t>
             </a:fld>
             <a:endParaRPr lang="en-US" dirty="0"/>
           </a:p>
@@ -13246,7 +13246,7 @@
           <a:p>
             <a:fld id="{FF0E21EC-8229-44A4-AFC2-EF3BF1208E04}" type="datetime1">
               <a:rPr lang="en-US" smtClean="0"/>
-              <a:t>4/12/2018</a:t>
+              <a:t>5/3/2018</a:t>
             </a:fld>
             <a:endParaRPr lang="en-US" dirty="0"/>
           </a:p>
@@ -13519,7 +13519,7 @@
           <a:p>
             <a:fld id="{964EEF8B-A449-4F10-BCAF-AAB54130F8A6}" type="datetime1">
               <a:rPr lang="en-US" smtClean="0"/>
-              <a:t>4/12/2018</a:t>
+              <a:t>5/3/2018</a:t>
             </a:fld>
             <a:endParaRPr lang="en-US" dirty="0"/>
           </a:p>
@@ -13927,7 +13927,7 @@
           <a:p>
             <a:fld id="{7BE25CEF-ABB8-4B96-AEDF-E3FB1EE4BE55}" type="datetime1">
               <a:rPr lang="en-US" smtClean="0"/>
-              <a:t>4/12/2018</a:t>
+              <a:t>5/3/2018</a:t>
             </a:fld>
             <a:endParaRPr lang="en-US" dirty="0"/>
           </a:p>
@@ -14046,7 +14046,7 @@
           <a:p>
             <a:fld id="{7FEDE285-7309-4451-B354-BCD3641147A4}" type="datetime1">
               <a:rPr lang="en-US" smtClean="0"/>
-              <a:t>4/12/2018</a:t>
+              <a:t>5/3/2018</a:t>
             </a:fld>
             <a:endParaRPr lang="en-US" dirty="0"/>
           </a:p>
@@ -14142,7 +14142,7 @@
           <a:p>
             <a:fld id="{A903FF69-E459-4EFD-B172-EFAA4C8E8FCF}" type="datetime1">
               <a:rPr lang="en-US" smtClean="0"/>
-              <a:t>4/12/2018</a:t>
+              <a:t>5/3/2018</a:t>
             </a:fld>
             <a:endParaRPr lang="en-US" dirty="0"/>
           </a:p>
@@ -14433,7 +14433,7 @@
           <a:p>
             <a:fld id="{01DB7383-1327-4479-A070-3DE39757C7F0}" type="datetime1">
               <a:rPr lang="en-US" smtClean="0"/>
-              <a:t>4/12/2018</a:t>
+              <a:t>5/3/2018</a:t>
             </a:fld>
             <a:endParaRPr lang="en-US" dirty="0"/>
           </a:p>
@@ -14714,7 +14714,7 @@
           <a:p>
             <a:fld id="{34D1AEF9-D031-4D5C-9A43-EE5D7D6742EB}" type="datetime1">
               <a:rPr lang="en-US" smtClean="0"/>
-              <a:t>4/12/2018</a:t>
+              <a:t>5/3/2018</a:t>
             </a:fld>
             <a:endParaRPr lang="en-US" dirty="0"/>
           </a:p>
@@ -14965,7 +14965,7 @@
           <a:p>
             <a:fld id="{E54CC657-A628-488C-BE9D-0C6758294A43}" type="datetime1">
               <a:rPr lang="en-US" smtClean="0"/>
-              <a:t>4/12/2018</a:t>
+              <a:t>5/3/2018</a:t>
             </a:fld>
             <a:endParaRPr lang="en-US" dirty="0"/>
           </a:p>

</xml_diff>